<commit_message>
Break out the locking lab into its own file
</commit_message>
<xml_diff>
--- a/undergraduate/labs/processes.pptx
+++ b/undergraduate/labs/processes.pptx
@@ -5,12 +5,11 @@
     <p:sldMasterId id="2147483786" r:id="rId1"/>
   </p:sldMasterIdLst>
   <p:notesMasterIdLst>
-    <p:notesMasterId r:id="rId5"/>
+    <p:notesMasterId r:id="rId4"/>
   </p:notesMasterIdLst>
   <p:sldIdLst>
     <p:sldId id="261" r:id="rId2"/>
     <p:sldId id="260" r:id="rId3"/>
-    <p:sldId id="262" r:id="rId4"/>
   </p:sldIdLst>
   <p:sldSz cx="12192000" cy="6858000"/>
   <p:notesSz cx="6858000" cy="9144000"/>
@@ -4477,11 +4476,7 @@
           <a:p>
             <a:r>
               <a:rPr lang="en-US" dirty="0" smtClean="0"/>
-              <a:t>Process Lab </a:t>
-            </a:r>
-            <a:r>
-              <a:rPr lang="en-US" dirty="0" smtClean="0"/>
-              <a:t>Exercises</a:t>
+              <a:t>Process Lab Exercises</a:t>
             </a:r>
             <a:endParaRPr lang="en-US" dirty="0"/>
           </a:p>
@@ -4616,11 +4611,6 @@
               </a:rPr>
               <a:t>exit()</a:t>
             </a:r>
-            <a:endParaRPr lang="en-US" dirty="0" smtClean="0">
-              <a:latin typeface="Courier" charset="0"/>
-              <a:ea typeface="Courier" charset="0"/>
-              <a:cs typeface="Courier" charset="0"/>
-            </a:endParaRPr>
           </a:p>
         </p:txBody>
       </p:sp>
@@ -4697,185 +4687,6 @@
     <p:extLst>
       <p:ext uri="{BB962C8B-B14F-4D97-AF65-F5344CB8AC3E}">
         <p14:creationId xmlns:p14="http://schemas.microsoft.com/office/powerpoint/2010/main" val="255175042"/>
-      </p:ext>
-    </p:extLst>
-  </p:cSld>
-  <p:clrMapOvr>
-    <a:masterClrMapping/>
-  </p:clrMapOvr>
-</p:sld>
-</file>
-
-<file path=ppt/slides/slide3.xml><?xml version="1.0" encoding="utf-8"?>
-<p:sld xmlns:a="http://schemas.openxmlformats.org/drawingml/2006/main" xmlns:r="http://schemas.openxmlformats.org/officeDocument/2006/relationships" xmlns:p="http://schemas.openxmlformats.org/presentationml/2006/main">
-  <p:cSld>
-    <p:spTree>
-      <p:nvGrpSpPr>
-        <p:cNvPr id="1" name=""/>
-        <p:cNvGrpSpPr/>
-        <p:nvPr/>
-      </p:nvGrpSpPr>
-      <p:grpSpPr>
-        <a:xfrm>
-          <a:off x="0" y="0"/>
-          <a:ext cx="0" cy="0"/>
-          <a:chOff x="0" y="0"/>
-          <a:chExt cx="0" cy="0"/>
-        </a:xfrm>
-      </p:grpSpPr>
-      <p:sp>
-        <p:nvSpPr>
-          <p:cNvPr id="2" name="Title 1"/>
-          <p:cNvSpPr>
-            <a:spLocks noGrp="1"/>
-          </p:cNvSpPr>
-          <p:nvPr>
-            <p:ph type="title"/>
-          </p:nvPr>
-        </p:nvSpPr>
-        <p:spPr/>
-        <p:txBody>
-          <a:bodyPr/>
-          <a:lstStyle/>
-          <a:p>
-            <a:r>
-              <a:rPr lang="en-US" dirty="0" smtClean="0"/>
-              <a:t>Locking Lab Exercises</a:t>
-            </a:r>
-            <a:endParaRPr lang="en-US" dirty="0"/>
-          </a:p>
-        </p:txBody>
-      </p:sp>
-      <p:sp>
-        <p:nvSpPr>
-          <p:cNvPr id="3" name="Content Placeholder 2"/>
-          <p:cNvSpPr>
-            <a:spLocks noGrp="1"/>
-          </p:cNvSpPr>
-          <p:nvPr>
-            <p:ph idx="1"/>
-          </p:nvPr>
-        </p:nvSpPr>
-        <p:spPr/>
-        <p:txBody>
-          <a:bodyPr/>
-          <a:lstStyle/>
-          <a:p>
-            <a:r>
-              <a:rPr lang="en-US" dirty="0" smtClean="0"/>
-              <a:t>Create </a:t>
-            </a:r>
-            <a:r>
-              <a:rPr lang="en-US" dirty="0"/>
-              <a:t>a one-liner to track lock acquisition  </a:t>
-            </a:r>
-          </a:p>
-          <a:p>
-            <a:r>
-              <a:rPr lang="en-US" dirty="0" smtClean="0"/>
-              <a:t>Track </a:t>
-            </a:r>
-            <a:r>
-              <a:rPr lang="en-US" dirty="0"/>
-              <a:t>spin locks  </a:t>
-            </a:r>
-          </a:p>
-          <a:p>
-            <a:r>
-              <a:rPr lang="en-US" dirty="0" smtClean="0"/>
-              <a:t>Write </a:t>
-            </a:r>
-            <a:r>
-              <a:rPr lang="en-US" dirty="0"/>
-              <a:t>a one-liner to show where locks </a:t>
-            </a:r>
-            <a:r>
-              <a:rPr lang="en-US"/>
-              <a:t>are </a:t>
-            </a:r>
-            <a:r>
-              <a:rPr lang="en-US" smtClean="0"/>
-              <a:t>acquired</a:t>
-            </a:r>
-          </a:p>
-          <a:p>
-            <a:endParaRPr lang="en-US" dirty="0"/>
-          </a:p>
-        </p:txBody>
-      </p:sp>
-      <p:sp>
-        <p:nvSpPr>
-          <p:cNvPr id="4" name="Date Placeholder 3"/>
-          <p:cNvSpPr>
-            <a:spLocks noGrp="1"/>
-          </p:cNvSpPr>
-          <p:nvPr>
-            <p:ph type="dt" sz="half" idx="10"/>
-          </p:nvPr>
-        </p:nvSpPr>
-        <p:spPr/>
-        <p:txBody>
-          <a:bodyPr/>
-          <a:lstStyle/>
-          <a:p>
-            <a:fld id="{BC4AE5AA-C6FF-5A4F-9D02-E3454F0B3602}" type="datetime1">
-              <a:rPr lang="en-US" smtClean="0"/>
-              <a:t>2/23/17</a:t>
-            </a:fld>
-            <a:endParaRPr lang="en-US"/>
-          </a:p>
-        </p:txBody>
-      </p:sp>
-      <p:sp>
-        <p:nvSpPr>
-          <p:cNvPr id="5" name="Footer Placeholder 4"/>
-          <p:cNvSpPr>
-            <a:spLocks noGrp="1"/>
-          </p:cNvSpPr>
-          <p:nvPr>
-            <p:ph type="ftr" sz="quarter" idx="11"/>
-          </p:nvPr>
-        </p:nvSpPr>
-        <p:spPr/>
-        <p:txBody>
-          <a:bodyPr/>
-          <a:lstStyle/>
-          <a:p>
-            <a:r>
-              <a:rPr lang="en-US" smtClean="0"/>
-              <a:t>Developing Products with FreeBSD</a:t>
-            </a:r>
-            <a:endParaRPr lang="en-US" dirty="0"/>
-          </a:p>
-        </p:txBody>
-      </p:sp>
-      <p:sp>
-        <p:nvSpPr>
-          <p:cNvPr id="6" name="Slide Number Placeholder 5"/>
-          <p:cNvSpPr>
-            <a:spLocks noGrp="1"/>
-          </p:cNvSpPr>
-          <p:nvPr>
-            <p:ph type="sldNum" sz="quarter" idx="12"/>
-          </p:nvPr>
-        </p:nvSpPr>
-        <p:spPr/>
-        <p:txBody>
-          <a:bodyPr/>
-          <a:lstStyle/>
-          <a:p>
-            <a:fld id="{699C44C4-0FAD-8046-A5C4-05AB318FA424}" type="slidenum">
-              <a:rPr lang="en-US" smtClean="0"/>
-              <a:t>3</a:t>
-            </a:fld>
-            <a:endParaRPr lang="en-US"/>
-          </a:p>
-        </p:txBody>
-      </p:sp>
-    </p:spTree>
-    <p:extLst>
-      <p:ext uri="{BB962C8B-B14F-4D97-AF65-F5344CB8AC3E}">
-        <p14:creationId xmlns:p14="http://schemas.microsoft.com/office/powerpoint/2010/main" val="104984443"/>
       </p:ext>
     </p:extLst>
   </p:cSld>

</xml_diff>